<commit_message>
include feedback from dry run
</commit_message>
<xml_diff>
--- a/ppt/intro-to-streamlit.pptx
+++ b/ppt/intro-to-streamlit.pptx
@@ -5,10 +5,10 @@
     <p:sldMasterId id="2147483648" r:id="rId1"/>
   </p:sldMasterIdLst>
   <p:notesMasterIdLst>
-    <p:notesMasterId r:id="rId16"/>
+    <p:notesMasterId r:id="rId17"/>
   </p:notesMasterIdLst>
   <p:handoutMasterIdLst>
-    <p:handoutMasterId r:id="rId17"/>
+    <p:handoutMasterId r:id="rId18"/>
   </p:handoutMasterIdLst>
   <p:sldIdLst>
     <p:sldId id="295" r:id="rId2"/>
@@ -19,12 +19,13 @@
     <p:sldId id="291" r:id="rId7"/>
     <p:sldId id="302" r:id="rId8"/>
     <p:sldId id="303" r:id="rId9"/>
-    <p:sldId id="263" r:id="rId10"/>
-    <p:sldId id="264" r:id="rId11"/>
-    <p:sldId id="298" r:id="rId12"/>
-    <p:sldId id="299" r:id="rId13"/>
-    <p:sldId id="300" r:id="rId14"/>
-    <p:sldId id="296" r:id="rId15"/>
+    <p:sldId id="304" r:id="rId10"/>
+    <p:sldId id="263" r:id="rId11"/>
+    <p:sldId id="264" r:id="rId12"/>
+    <p:sldId id="298" r:id="rId13"/>
+    <p:sldId id="299" r:id="rId14"/>
+    <p:sldId id="300" r:id="rId15"/>
+    <p:sldId id="296" r:id="rId16"/>
   </p:sldIdLst>
   <p:sldSz cx="12192000" cy="6858000"/>
   <p:notesSz cx="6858000" cy="9144000"/>
@@ -238,7 +239,7 @@
           <a:p>
             <a:fld id="{412A36AD-C140-47B5-A0AA-2808AF1C1C9D}" type="datetimeFigureOut">
               <a:rPr lang="en-AU" smtClean="0"/>
-              <a:t>15/1/2025</a:t>
+              <a:t>24/1/2025</a:t>
             </a:fld>
             <a:endParaRPr lang="en-AU"/>
           </a:p>
@@ -403,7 +404,7 @@
           <a:p>
             <a:fld id="{2763829E-EB69-4A98-9D54-8D6822520B27}" type="datetimeFigureOut">
               <a:rPr lang="en-AU" smtClean="0"/>
-              <a:t>15/1/2025</a:t>
+              <a:t>24/1/2025</a:t>
             </a:fld>
             <a:endParaRPr lang="en-AU"/>
           </a:p>
@@ -10978,6 +10979,644 @@
           </a:bodyPr>
           <a:lstStyle/>
           <a:p>
+            <a:pPr marL="407988" indent="-398463">
+              <a:buSzPct val="80000"/>
+              <a:buFont typeface="System Font Regular"/>
+              <a:buChar char="🧑‍💻"/>
+            </a:pPr>
+            <a:r>
+              <a:rPr lang="en-AU" dirty="0"/>
+              <a:t>How to set up a </a:t>
+            </a:r>
+            <a:r>
+              <a:rPr lang="en-AU" dirty="0" err="1"/>
+              <a:t>Streamlit</a:t>
+            </a:r>
+            <a:r>
+              <a:rPr lang="en-AU" dirty="0"/>
+              <a:t> development environment</a:t>
+            </a:r>
+          </a:p>
+          <a:p>
+            <a:pPr marL="407988" indent="-398463">
+              <a:buSzPct val="80000"/>
+              <a:buFont typeface="System Font Regular"/>
+              <a:buChar char="💡"/>
+            </a:pPr>
+            <a:r>
+              <a:rPr lang="en-AU" dirty="0"/>
+              <a:t>Understand </a:t>
+            </a:r>
+            <a:r>
+              <a:rPr lang="en-AU" dirty="0" err="1"/>
+              <a:t>Streamlit’s</a:t>
+            </a:r>
+            <a:r>
+              <a:rPr lang="en-AU" dirty="0"/>
+              <a:t> data and programming flow</a:t>
+            </a:r>
+          </a:p>
+          <a:p>
+            <a:pPr marL="407988" indent="-398463">
+              <a:buSzPct val="80000"/>
+              <a:buFont typeface="System Font Regular"/>
+              <a:buChar char="🎛️"/>
+            </a:pPr>
+            <a:r>
+              <a:rPr lang="en-AU" dirty="0"/>
+              <a:t>Get to know some basic UI widgets</a:t>
+            </a:r>
+          </a:p>
+          <a:p>
+            <a:pPr marL="407988" indent="-398463">
+              <a:buSzPct val="80000"/>
+              <a:buFont typeface="System Font Regular"/>
+              <a:buChar char="📐"/>
+            </a:pPr>
+            <a:r>
+              <a:rPr lang="en-AU" dirty="0"/>
+              <a:t>Learn about layout components</a:t>
+            </a:r>
+          </a:p>
+          <a:p>
+            <a:pPr marL="407988" indent="-398463">
+              <a:buSzPct val="80000"/>
+              <a:buFont typeface="System Font Regular"/>
+              <a:buChar char="🤔"/>
+            </a:pPr>
+            <a:r>
+              <a:rPr lang="en-AU" dirty="0"/>
+              <a:t>Understand the concept of session state in </a:t>
+            </a:r>
+            <a:r>
+              <a:rPr lang="en-AU" dirty="0" err="1"/>
+              <a:t>Streamlit</a:t>
+            </a:r>
+            <a:r>
+              <a:rPr lang="en-AU" dirty="0"/>
+              <a:t> apps</a:t>
+            </a:r>
+          </a:p>
+          <a:p>
+            <a:pPr marL="407988" indent="-398463">
+              <a:buSzPct val="80000"/>
+              <a:buFont typeface="System Font Regular"/>
+              <a:buChar char="🤩"/>
+            </a:pPr>
+            <a:r>
+              <a:rPr lang="en-AU" dirty="0"/>
+              <a:t>How to </a:t>
+            </a:r>
+            <a:r>
+              <a:rPr lang="en-AU"/>
+              <a:t>create a </a:t>
+            </a:r>
+            <a:r>
+              <a:rPr lang="en-AU" dirty="0"/>
+              <a:t>slick data dashboard</a:t>
+            </a:r>
+          </a:p>
+        </p:txBody>
+      </p:sp>
+      <p:sp>
+        <p:nvSpPr>
+          <p:cNvPr id="6" name="Title 5"/>
+          <p:cNvSpPr>
+            <a:spLocks noGrp="1"/>
+          </p:cNvSpPr>
+          <p:nvPr>
+            <p:ph type="title"/>
+          </p:nvPr>
+        </p:nvSpPr>
+        <p:spPr/>
+        <p:txBody>
+          <a:bodyPr/>
+          <a:lstStyle/>
+          <a:p>
+            <a:r>
+              <a:rPr lang="en-AU" dirty="0"/>
+              <a:t>What you will learn in this session</a:t>
+            </a:r>
+          </a:p>
+        </p:txBody>
+      </p:sp>
+      <p:sp>
+        <p:nvSpPr>
+          <p:cNvPr id="5" name="Footer Placeholder 4">
+            <a:extLst>
+              <a:ext uri="{FF2B5EF4-FFF2-40B4-BE49-F238E27FC236}">
+                <a16:creationId xmlns:a16="http://schemas.microsoft.com/office/drawing/2014/main" id="{839A4CBB-3097-4233-AC4B-E40743736210}"/>
+              </a:ext>
+            </a:extLst>
+          </p:cNvPr>
+          <p:cNvSpPr>
+            <a:spLocks noGrp="1"/>
+          </p:cNvSpPr>
+          <p:nvPr>
+            <p:ph type="ftr" sz="quarter" idx="12"/>
+          </p:nvPr>
+        </p:nvSpPr>
+        <p:spPr/>
+        <p:txBody>
+          <a:bodyPr/>
+          <a:lstStyle/>
+          <a:p>
+            <a:r>
+              <a:rPr lang="en-AU"/>
+              <a:t>Intro to Streamlit</a:t>
+            </a:r>
+            <a:endParaRPr lang="en-AU" dirty="0"/>
+          </a:p>
+        </p:txBody>
+      </p:sp>
+      <p:sp>
+        <p:nvSpPr>
+          <p:cNvPr id="10" name="Slide Number Placeholder 9">
+            <a:extLst>
+              <a:ext uri="{FF2B5EF4-FFF2-40B4-BE49-F238E27FC236}">
+                <a16:creationId xmlns:a16="http://schemas.microsoft.com/office/drawing/2014/main" id="{E14DA2D9-ABD9-451B-A5BC-C38E555A6AFE}"/>
+              </a:ext>
+            </a:extLst>
+          </p:cNvPr>
+          <p:cNvSpPr>
+            <a:spLocks noGrp="1"/>
+          </p:cNvSpPr>
+          <p:nvPr>
+            <p:ph type="sldNum" sz="quarter" idx="13"/>
+          </p:nvPr>
+        </p:nvSpPr>
+        <p:spPr/>
+        <p:txBody>
+          <a:bodyPr/>
+          <a:lstStyle/>
+          <a:p>
+            <a:fld id="{E917DE0E-AFB1-41FD-BC35-27DB61CA125F}" type="slidenum">
+              <a:rPr lang="en-AU" smtClean="0"/>
+              <a:pPr/>
+              <a:t>10</a:t>
+            </a:fld>
+            <a:endParaRPr lang="en-AU" dirty="0"/>
+          </a:p>
+        </p:txBody>
+      </p:sp>
+    </p:spTree>
+    <p:extLst>
+      <p:ext uri="{BB962C8B-B14F-4D97-AF65-F5344CB8AC3E}">
+        <p14:creationId xmlns:p14="http://schemas.microsoft.com/office/powerpoint/2010/main" val="1127843362"/>
+      </p:ext>
+    </p:extLst>
+  </p:cSld>
+  <p:clrMapOvr>
+    <a:masterClrMapping/>
+  </p:clrMapOvr>
+  <mc:AlternateContent xmlns:mc="http://schemas.openxmlformats.org/markup-compatibility/2006" xmlns:p14="http://schemas.microsoft.com/office/powerpoint/2010/main">
+    <mc:Choice Requires="p14">
+      <p:transition spd="med" p14:dur="700">
+        <p:fade/>
+      </p:transition>
+    </mc:Choice>
+    <mc:Fallback xmlns="">
+      <p:transition spd="med">
+        <p:fade/>
+      </p:transition>
+    </mc:Fallback>
+  </mc:AlternateContent>
+  <p:timing>
+    <p:tnLst>
+      <p:par>
+        <p:cTn id="1" dur="indefinite" restart="never" nodeType="tmRoot">
+          <p:childTnLst>
+            <p:seq concurrent="1" nextAc="seek">
+              <p:cTn id="2" dur="indefinite" nodeType="mainSeq">
+                <p:childTnLst>
+                  <p:par>
+                    <p:cTn id="3" fill="hold">
+                      <p:stCondLst>
+                        <p:cond delay="indefinite"/>
+                      </p:stCondLst>
+                      <p:childTnLst>
+                        <p:par>
+                          <p:cTn id="4" fill="hold">
+                            <p:stCondLst>
+                              <p:cond delay="0"/>
+                            </p:stCondLst>
+                            <p:childTnLst>
+                              <p:par>
+                                <p:cTn id="5" presetID="10" presetClass="entr" presetSubtype="0" fill="hold" grpId="0" nodeType="clickEffect">
+                                  <p:stCondLst>
+                                    <p:cond delay="0"/>
+                                  </p:stCondLst>
+                                  <p:childTnLst>
+                                    <p:set>
+                                      <p:cBhvr>
+                                        <p:cTn id="6" dur="1" fill="hold">
+                                          <p:stCondLst>
+                                            <p:cond delay="0"/>
+                                          </p:stCondLst>
+                                        </p:cTn>
+                                        <p:tgtEl>
+                                          <p:spTgt spid="7">
+                                            <p:txEl>
+                                              <p:pRg st="0" end="0"/>
+                                            </p:txEl>
+                                          </p:spTgt>
+                                        </p:tgtEl>
+                                        <p:attrNameLst>
+                                          <p:attrName>style.visibility</p:attrName>
+                                        </p:attrNameLst>
+                                      </p:cBhvr>
+                                      <p:to>
+                                        <p:strVal val="visible"/>
+                                      </p:to>
+                                    </p:set>
+                                    <p:animEffect transition="in" filter="fade">
+                                      <p:cBhvr>
+                                        <p:cTn id="7" dur="500"/>
+                                        <p:tgtEl>
+                                          <p:spTgt spid="7">
+                                            <p:txEl>
+                                              <p:pRg st="0" end="0"/>
+                                            </p:txEl>
+                                          </p:spTgt>
+                                        </p:tgtEl>
+                                      </p:cBhvr>
+                                    </p:animEffect>
+                                  </p:childTnLst>
+                                </p:cTn>
+                              </p:par>
+                            </p:childTnLst>
+                          </p:cTn>
+                        </p:par>
+                      </p:childTnLst>
+                    </p:cTn>
+                  </p:par>
+                  <p:par>
+                    <p:cTn id="8" fill="hold">
+                      <p:stCondLst>
+                        <p:cond delay="indefinite"/>
+                      </p:stCondLst>
+                      <p:childTnLst>
+                        <p:par>
+                          <p:cTn id="9" fill="hold">
+                            <p:stCondLst>
+                              <p:cond delay="0"/>
+                            </p:stCondLst>
+                            <p:childTnLst>
+                              <p:par>
+                                <p:cTn id="10" presetID="10" presetClass="entr" presetSubtype="0" fill="hold" grpId="0" nodeType="clickEffect">
+                                  <p:stCondLst>
+                                    <p:cond delay="0"/>
+                                  </p:stCondLst>
+                                  <p:childTnLst>
+                                    <p:set>
+                                      <p:cBhvr>
+                                        <p:cTn id="11" dur="1" fill="hold">
+                                          <p:stCondLst>
+                                            <p:cond delay="0"/>
+                                          </p:stCondLst>
+                                        </p:cTn>
+                                        <p:tgtEl>
+                                          <p:spTgt spid="7">
+                                            <p:txEl>
+                                              <p:pRg st="1" end="1"/>
+                                            </p:txEl>
+                                          </p:spTgt>
+                                        </p:tgtEl>
+                                        <p:attrNameLst>
+                                          <p:attrName>style.visibility</p:attrName>
+                                        </p:attrNameLst>
+                                      </p:cBhvr>
+                                      <p:to>
+                                        <p:strVal val="visible"/>
+                                      </p:to>
+                                    </p:set>
+                                    <p:animEffect transition="in" filter="fade">
+                                      <p:cBhvr>
+                                        <p:cTn id="12" dur="500"/>
+                                        <p:tgtEl>
+                                          <p:spTgt spid="7">
+                                            <p:txEl>
+                                              <p:pRg st="1" end="1"/>
+                                            </p:txEl>
+                                          </p:spTgt>
+                                        </p:tgtEl>
+                                      </p:cBhvr>
+                                    </p:animEffect>
+                                  </p:childTnLst>
+                                </p:cTn>
+                              </p:par>
+                            </p:childTnLst>
+                          </p:cTn>
+                        </p:par>
+                      </p:childTnLst>
+                    </p:cTn>
+                  </p:par>
+                  <p:par>
+                    <p:cTn id="13" fill="hold">
+                      <p:stCondLst>
+                        <p:cond delay="indefinite"/>
+                      </p:stCondLst>
+                      <p:childTnLst>
+                        <p:par>
+                          <p:cTn id="14" fill="hold">
+                            <p:stCondLst>
+                              <p:cond delay="0"/>
+                            </p:stCondLst>
+                            <p:childTnLst>
+                              <p:par>
+                                <p:cTn id="15" presetID="10" presetClass="entr" presetSubtype="0" fill="hold" grpId="0" nodeType="clickEffect">
+                                  <p:stCondLst>
+                                    <p:cond delay="0"/>
+                                  </p:stCondLst>
+                                  <p:childTnLst>
+                                    <p:set>
+                                      <p:cBhvr>
+                                        <p:cTn id="16" dur="1" fill="hold">
+                                          <p:stCondLst>
+                                            <p:cond delay="0"/>
+                                          </p:stCondLst>
+                                        </p:cTn>
+                                        <p:tgtEl>
+                                          <p:spTgt spid="7">
+                                            <p:txEl>
+                                              <p:pRg st="2" end="2"/>
+                                            </p:txEl>
+                                          </p:spTgt>
+                                        </p:tgtEl>
+                                        <p:attrNameLst>
+                                          <p:attrName>style.visibility</p:attrName>
+                                        </p:attrNameLst>
+                                      </p:cBhvr>
+                                      <p:to>
+                                        <p:strVal val="visible"/>
+                                      </p:to>
+                                    </p:set>
+                                    <p:animEffect transition="in" filter="fade">
+                                      <p:cBhvr>
+                                        <p:cTn id="17" dur="500"/>
+                                        <p:tgtEl>
+                                          <p:spTgt spid="7">
+                                            <p:txEl>
+                                              <p:pRg st="2" end="2"/>
+                                            </p:txEl>
+                                          </p:spTgt>
+                                        </p:tgtEl>
+                                      </p:cBhvr>
+                                    </p:animEffect>
+                                  </p:childTnLst>
+                                </p:cTn>
+                              </p:par>
+                            </p:childTnLst>
+                          </p:cTn>
+                        </p:par>
+                      </p:childTnLst>
+                    </p:cTn>
+                  </p:par>
+                  <p:par>
+                    <p:cTn id="18" fill="hold">
+                      <p:stCondLst>
+                        <p:cond delay="indefinite"/>
+                      </p:stCondLst>
+                      <p:childTnLst>
+                        <p:par>
+                          <p:cTn id="19" fill="hold">
+                            <p:stCondLst>
+                              <p:cond delay="0"/>
+                            </p:stCondLst>
+                            <p:childTnLst>
+                              <p:par>
+                                <p:cTn id="20" presetID="10" presetClass="entr" presetSubtype="0" fill="hold" grpId="0" nodeType="clickEffect">
+                                  <p:stCondLst>
+                                    <p:cond delay="0"/>
+                                  </p:stCondLst>
+                                  <p:childTnLst>
+                                    <p:set>
+                                      <p:cBhvr>
+                                        <p:cTn id="21" dur="1" fill="hold">
+                                          <p:stCondLst>
+                                            <p:cond delay="0"/>
+                                          </p:stCondLst>
+                                        </p:cTn>
+                                        <p:tgtEl>
+                                          <p:spTgt spid="7">
+                                            <p:txEl>
+                                              <p:pRg st="3" end="3"/>
+                                            </p:txEl>
+                                          </p:spTgt>
+                                        </p:tgtEl>
+                                        <p:attrNameLst>
+                                          <p:attrName>style.visibility</p:attrName>
+                                        </p:attrNameLst>
+                                      </p:cBhvr>
+                                      <p:to>
+                                        <p:strVal val="visible"/>
+                                      </p:to>
+                                    </p:set>
+                                    <p:animEffect transition="in" filter="fade">
+                                      <p:cBhvr>
+                                        <p:cTn id="22" dur="500"/>
+                                        <p:tgtEl>
+                                          <p:spTgt spid="7">
+                                            <p:txEl>
+                                              <p:pRg st="3" end="3"/>
+                                            </p:txEl>
+                                          </p:spTgt>
+                                        </p:tgtEl>
+                                      </p:cBhvr>
+                                    </p:animEffect>
+                                  </p:childTnLst>
+                                </p:cTn>
+                              </p:par>
+                            </p:childTnLst>
+                          </p:cTn>
+                        </p:par>
+                      </p:childTnLst>
+                    </p:cTn>
+                  </p:par>
+                  <p:par>
+                    <p:cTn id="23" fill="hold">
+                      <p:stCondLst>
+                        <p:cond delay="indefinite"/>
+                      </p:stCondLst>
+                      <p:childTnLst>
+                        <p:par>
+                          <p:cTn id="24" fill="hold">
+                            <p:stCondLst>
+                              <p:cond delay="0"/>
+                            </p:stCondLst>
+                            <p:childTnLst>
+                              <p:par>
+                                <p:cTn id="25" presetID="10" presetClass="entr" presetSubtype="0" fill="hold" grpId="0" nodeType="clickEffect">
+                                  <p:stCondLst>
+                                    <p:cond delay="0"/>
+                                  </p:stCondLst>
+                                  <p:childTnLst>
+                                    <p:set>
+                                      <p:cBhvr>
+                                        <p:cTn id="26" dur="1" fill="hold">
+                                          <p:stCondLst>
+                                            <p:cond delay="0"/>
+                                          </p:stCondLst>
+                                        </p:cTn>
+                                        <p:tgtEl>
+                                          <p:spTgt spid="7">
+                                            <p:txEl>
+                                              <p:pRg st="4" end="4"/>
+                                            </p:txEl>
+                                          </p:spTgt>
+                                        </p:tgtEl>
+                                        <p:attrNameLst>
+                                          <p:attrName>style.visibility</p:attrName>
+                                        </p:attrNameLst>
+                                      </p:cBhvr>
+                                      <p:to>
+                                        <p:strVal val="visible"/>
+                                      </p:to>
+                                    </p:set>
+                                    <p:animEffect transition="in" filter="fade">
+                                      <p:cBhvr>
+                                        <p:cTn id="27" dur="500"/>
+                                        <p:tgtEl>
+                                          <p:spTgt spid="7">
+                                            <p:txEl>
+                                              <p:pRg st="4" end="4"/>
+                                            </p:txEl>
+                                          </p:spTgt>
+                                        </p:tgtEl>
+                                      </p:cBhvr>
+                                    </p:animEffect>
+                                  </p:childTnLst>
+                                </p:cTn>
+                              </p:par>
+                            </p:childTnLst>
+                          </p:cTn>
+                        </p:par>
+                      </p:childTnLst>
+                    </p:cTn>
+                  </p:par>
+                  <p:par>
+                    <p:cTn id="28" fill="hold">
+                      <p:stCondLst>
+                        <p:cond delay="indefinite"/>
+                      </p:stCondLst>
+                      <p:childTnLst>
+                        <p:par>
+                          <p:cTn id="29" fill="hold">
+                            <p:stCondLst>
+                              <p:cond delay="0"/>
+                            </p:stCondLst>
+                            <p:childTnLst>
+                              <p:par>
+                                <p:cTn id="30" presetID="10" presetClass="entr" presetSubtype="0" fill="hold" grpId="0" nodeType="clickEffect">
+                                  <p:stCondLst>
+                                    <p:cond delay="0"/>
+                                  </p:stCondLst>
+                                  <p:childTnLst>
+                                    <p:set>
+                                      <p:cBhvr>
+                                        <p:cTn id="31" dur="1" fill="hold">
+                                          <p:stCondLst>
+                                            <p:cond delay="0"/>
+                                          </p:stCondLst>
+                                        </p:cTn>
+                                        <p:tgtEl>
+                                          <p:spTgt spid="7">
+                                            <p:txEl>
+                                              <p:pRg st="5" end="5"/>
+                                            </p:txEl>
+                                          </p:spTgt>
+                                        </p:tgtEl>
+                                        <p:attrNameLst>
+                                          <p:attrName>style.visibility</p:attrName>
+                                        </p:attrNameLst>
+                                      </p:cBhvr>
+                                      <p:to>
+                                        <p:strVal val="visible"/>
+                                      </p:to>
+                                    </p:set>
+                                    <p:animEffect transition="in" filter="fade">
+                                      <p:cBhvr>
+                                        <p:cTn id="32" dur="500"/>
+                                        <p:tgtEl>
+                                          <p:spTgt spid="7">
+                                            <p:txEl>
+                                              <p:pRg st="5" end="5"/>
+                                            </p:txEl>
+                                          </p:spTgt>
+                                        </p:tgtEl>
+                                      </p:cBhvr>
+                                    </p:animEffect>
+                                  </p:childTnLst>
+                                </p:cTn>
+                              </p:par>
+                            </p:childTnLst>
+                          </p:cTn>
+                        </p:par>
+                      </p:childTnLst>
+                    </p:cTn>
+                  </p:par>
+                </p:childTnLst>
+              </p:cTn>
+              <p:prevCondLst>
+                <p:cond evt="onPrev" delay="0">
+                  <p:tgtEl>
+                    <p:sldTgt/>
+                  </p:tgtEl>
+                </p:cond>
+              </p:prevCondLst>
+              <p:nextCondLst>
+                <p:cond evt="onNext" delay="0">
+                  <p:tgtEl>
+                    <p:sldTgt/>
+                  </p:tgtEl>
+                </p:cond>
+              </p:nextCondLst>
+            </p:seq>
+          </p:childTnLst>
+        </p:cTn>
+      </p:par>
+    </p:tnLst>
+    <p:bldLst>
+      <p:bldP spid="7" grpId="0" build="p"/>
+    </p:bldLst>
+  </p:timing>
+</p:sld>
+</file>
+
+<file path=ppt/slides/slide11.xml><?xml version="1.0" encoding="utf-8"?>
+<p:sld xmlns:a="http://schemas.openxmlformats.org/drawingml/2006/main" xmlns:r="http://schemas.openxmlformats.org/officeDocument/2006/relationships" xmlns:p="http://schemas.openxmlformats.org/presentationml/2006/main">
+  <p:cSld>
+    <p:spTree>
+      <p:nvGrpSpPr>
+        <p:cNvPr id="1" name=""/>
+        <p:cNvGrpSpPr/>
+        <p:nvPr/>
+      </p:nvGrpSpPr>
+      <p:grpSpPr>
+        <a:xfrm>
+          <a:off x="0" y="0"/>
+          <a:ext cx="0" cy="0"/>
+          <a:chOff x="0" y="0"/>
+          <a:chExt cx="0" cy="0"/>
+        </a:xfrm>
+      </p:grpSpPr>
+      <p:sp>
+        <p:nvSpPr>
+          <p:cNvPr id="7" name="Content Placeholder 6"/>
+          <p:cNvSpPr>
+            <a:spLocks noGrp="1"/>
+          </p:cNvSpPr>
+          <p:nvPr>
+            <p:ph sz="quarter" idx="11"/>
+          </p:nvPr>
+        </p:nvSpPr>
+        <p:spPr/>
+        <p:txBody>
+          <a:bodyPr>
+            <a:normAutofit/>
+          </a:bodyPr>
+          <a:lstStyle/>
+          <a:p>
             <a:pPr marL="460375" indent="-450850">
               <a:buBlip>
                 <a:blip r:embed="rId2"/>
@@ -11137,7 +11776,7 @@
             <a:fld id="{E917DE0E-AFB1-41FD-BC35-27DB61CA125F}" type="slidenum">
               <a:rPr lang="en-AU" smtClean="0"/>
               <a:pPr/>
-              <a:t>10</a:t>
+              <a:t>11</a:t>
             </a:fld>
             <a:endParaRPr lang="en-AU" dirty="0"/>
           </a:p>
@@ -11445,7 +12084,7 @@
 </p:sld>
 </file>
 
-<file path=ppt/slides/slide11.xml><?xml version="1.0" encoding="utf-8"?>
+<file path=ppt/slides/slide12.xml><?xml version="1.0" encoding="utf-8"?>
 <p:sld xmlns:a="http://schemas.openxmlformats.org/drawingml/2006/main" xmlns:r="http://schemas.openxmlformats.org/officeDocument/2006/relationships" xmlns:p="http://schemas.openxmlformats.org/presentationml/2006/main">
   <p:cSld>
     <p:spTree>
@@ -11571,7 +12210,7 @@
             <a:fld id="{E917DE0E-AFB1-41FD-BC35-27DB61CA125F}" type="slidenum">
               <a:rPr lang="en-AU" smtClean="0"/>
               <a:pPr/>
-              <a:t>11</a:t>
+              <a:t>12</a:t>
             </a:fld>
             <a:endParaRPr lang="en-AU" dirty="0"/>
           </a:p>
@@ -11602,7 +12241,7 @@
 </p:sld>
 </file>
 
-<file path=ppt/slides/slide12.xml><?xml version="1.0" encoding="utf-8"?>
+<file path=ppt/slides/slide13.xml><?xml version="1.0" encoding="utf-8"?>
 <p:sld xmlns:a="http://schemas.openxmlformats.org/drawingml/2006/main" xmlns:r="http://schemas.openxmlformats.org/officeDocument/2006/relationships" xmlns:p="http://schemas.openxmlformats.org/presentationml/2006/main">
   <p:cSld>
     <p:spTree>
@@ -11821,7 +12460,7 @@
             <a:fld id="{E917DE0E-AFB1-41FD-BC35-27DB61CA125F}" type="slidenum">
               <a:rPr lang="en-AU" smtClean="0"/>
               <a:pPr/>
-              <a:t>12</a:t>
+              <a:t>13</a:t>
             </a:fld>
             <a:endParaRPr lang="en-AU" dirty="0"/>
           </a:p>
@@ -12190,7 +12829,7 @@
 </p:sld>
 </file>
 
-<file path=ppt/slides/slide13.xml><?xml version="1.0" encoding="utf-8"?>
+<file path=ppt/slides/slide14.xml><?xml version="1.0" encoding="utf-8"?>
 <p:sld xmlns:a="http://schemas.openxmlformats.org/drawingml/2006/main" xmlns:r="http://schemas.openxmlformats.org/officeDocument/2006/relationships" xmlns:p="http://schemas.openxmlformats.org/presentationml/2006/main">
   <p:cSld>
     <p:spTree>
@@ -12422,7 +13061,7 @@
             <a:fld id="{E917DE0E-AFB1-41FD-BC35-27DB61CA125F}" type="slidenum">
               <a:rPr lang="en-AU" smtClean="0"/>
               <a:pPr/>
-              <a:t>13</a:t>
+              <a:t>14</a:t>
             </a:fld>
             <a:endParaRPr lang="en-AU" dirty="0"/>
           </a:p>
@@ -12852,7 +13491,7 @@
 </p:sld>
 </file>
 
-<file path=ppt/slides/slide14.xml><?xml version="1.0" encoding="utf-8"?>
+<file path=ppt/slides/slide15.xml><?xml version="1.0" encoding="utf-8"?>
 <p:sld xmlns:a="http://schemas.openxmlformats.org/drawingml/2006/main" xmlns:r="http://schemas.openxmlformats.org/officeDocument/2006/relationships" xmlns:p="http://schemas.openxmlformats.org/presentationml/2006/main">
   <p:cSld>
     <p:spTree>
@@ -12951,7 +13590,7 @@
             <a:fld id="{E917DE0E-AFB1-41FD-BC35-27DB61CA125F}" type="slidenum">
               <a:rPr lang="en-AU" smtClean="0"/>
               <a:pPr/>
-              <a:t>14</a:t>
+              <a:t>15</a:t>
             </a:fld>
             <a:endParaRPr lang="en-AU" dirty="0"/>
           </a:p>
@@ -14071,13 +14710,13 @@
   <p:clrMapOvr>
     <a:masterClrMapping/>
   </p:clrMapOvr>
-  <mc:AlternateContent xmlns:mc="http://schemas.openxmlformats.org/markup-compatibility/2006">
-    <mc:Choice xmlns:p14="http://schemas.microsoft.com/office/powerpoint/2010/main" Requires="p14">
+  <mc:AlternateContent xmlns:mc="http://schemas.openxmlformats.org/markup-compatibility/2006" xmlns:p14="http://schemas.microsoft.com/office/powerpoint/2010/main">
+    <mc:Choice Requires="p14">
       <p:transition spd="med" p14:dur="700">
         <p:fade/>
       </p:transition>
     </mc:Choice>
-    <mc:Fallback>
+    <mc:Fallback xmlns="">
       <p:transition spd="med">
         <p:fade/>
       </p:transition>
@@ -15256,13 +15895,13 @@
   <p:clrMapOvr>
     <a:masterClrMapping/>
   </p:clrMapOvr>
-  <mc:AlternateContent xmlns:mc="http://schemas.openxmlformats.org/markup-compatibility/2006">
-    <mc:Choice xmlns:p14="http://schemas.microsoft.com/office/powerpoint/2010/main" Requires="p14">
+  <mc:AlternateContent xmlns:mc="http://schemas.openxmlformats.org/markup-compatibility/2006" xmlns:p14="http://schemas.microsoft.com/office/powerpoint/2010/main">
+    <mc:Choice Requires="p14">
       <p:transition spd="med" p14:dur="700">
         <p:fade/>
       </p:transition>
     </mc:Choice>
-    <mc:Fallback>
+    <mc:Fallback xmlns="">
       <p:transition spd="med">
         <p:fade/>
       </p:transition>
@@ -15734,13 +16373,13 @@
   <p:clrMapOvr>
     <a:masterClrMapping/>
   </p:clrMapOvr>
-  <mc:AlternateContent xmlns:mc="http://schemas.openxmlformats.org/markup-compatibility/2006">
-    <mc:Choice xmlns:p14="http://schemas.microsoft.com/office/powerpoint/2010/main" Requires="p14">
+  <mc:AlternateContent xmlns:mc="http://schemas.openxmlformats.org/markup-compatibility/2006" xmlns:p14="http://schemas.microsoft.com/office/powerpoint/2010/main">
+    <mc:Choice Requires="p14">
       <p:transition spd="med" p14:dur="700">
         <p:fade/>
       </p:transition>
     </mc:Choice>
-    <mc:Fallback>
+    <mc:Fallback xmlns="">
       <p:transition spd="med">
         <p:fade/>
       </p:transition>
@@ -15768,115 +16407,13 @@
       </p:grpSpPr>
       <p:sp>
         <p:nvSpPr>
-          <p:cNvPr id="7" name="Content Placeholder 6"/>
-          <p:cNvSpPr>
-            <a:spLocks noGrp="1"/>
-          </p:cNvSpPr>
-          <p:nvPr>
-            <p:ph sz="quarter" idx="11"/>
-          </p:nvPr>
-        </p:nvSpPr>
-        <p:spPr/>
-        <p:txBody>
-          <a:bodyPr>
-            <a:normAutofit/>
-          </a:bodyPr>
-          <a:lstStyle/>
-          <a:p>
-            <a:pPr marL="407988" indent="-398463">
-              <a:buSzPct val="80000"/>
-              <a:buFont typeface="System Font Regular"/>
-              <a:buChar char="🧑‍💻"/>
-            </a:pPr>
-            <a:r>
-              <a:rPr lang="en-AU" dirty="0"/>
-              <a:t>How to set up a </a:t>
-            </a:r>
-            <a:r>
-              <a:rPr lang="en-AU" dirty="0" err="1"/>
-              <a:t>Streamlit</a:t>
-            </a:r>
-            <a:r>
-              <a:rPr lang="en-AU" dirty="0"/>
-              <a:t> development environment</a:t>
-            </a:r>
-          </a:p>
-          <a:p>
-            <a:pPr marL="407988" indent="-398463">
-              <a:buSzPct val="80000"/>
-              <a:buFont typeface="System Font Regular"/>
-              <a:buChar char="💡"/>
-            </a:pPr>
-            <a:r>
-              <a:rPr lang="en-AU" dirty="0"/>
-              <a:t>Understand </a:t>
-            </a:r>
-            <a:r>
-              <a:rPr lang="en-AU" dirty="0" err="1"/>
-              <a:t>Streamlit’s</a:t>
-            </a:r>
-            <a:r>
-              <a:rPr lang="en-AU" dirty="0"/>
-              <a:t> data and programming flow</a:t>
-            </a:r>
-          </a:p>
-          <a:p>
-            <a:pPr marL="407988" indent="-398463">
-              <a:buSzPct val="80000"/>
-              <a:buFont typeface="System Font Regular"/>
-              <a:buChar char="🎛️"/>
-            </a:pPr>
-            <a:r>
-              <a:rPr lang="en-AU" dirty="0"/>
-              <a:t>Get to know some basic UI widgets</a:t>
-            </a:r>
-          </a:p>
-          <a:p>
-            <a:pPr marL="407988" indent="-398463">
-              <a:buSzPct val="80000"/>
-              <a:buFont typeface="System Font Regular"/>
-              <a:buChar char="📐"/>
-            </a:pPr>
-            <a:r>
-              <a:rPr lang="en-AU" dirty="0"/>
-              <a:t>Learn about layout components</a:t>
-            </a:r>
-          </a:p>
-          <a:p>
-            <a:pPr marL="407988" indent="-398463">
-              <a:buSzPct val="80000"/>
-              <a:buFont typeface="System Font Regular"/>
-              <a:buChar char="🤔"/>
-            </a:pPr>
-            <a:r>
-              <a:rPr lang="en-AU" dirty="0"/>
-              <a:t>Understand the concept of session state in </a:t>
-            </a:r>
-            <a:r>
-              <a:rPr lang="en-AU" dirty="0" err="1"/>
-              <a:t>Streamlit</a:t>
-            </a:r>
-            <a:r>
-              <a:rPr lang="en-AU" dirty="0"/>
-              <a:t> apps</a:t>
-            </a:r>
-          </a:p>
-          <a:p>
-            <a:pPr marL="407988" indent="-398463">
-              <a:buSzPct val="80000"/>
-              <a:buFont typeface="System Font Regular"/>
-              <a:buChar char="🤩"/>
-            </a:pPr>
-            <a:r>
-              <a:rPr lang="en-AU" dirty="0"/>
-              <a:t>Create a slick data dashboard</a:t>
-            </a:r>
-          </a:p>
-        </p:txBody>
-      </p:sp>
-      <p:sp>
-        <p:nvSpPr>
-          <p:cNvPr id="6" name="Title 5"/>
+          <p:cNvPr id="6" name="Title 5">
+            <a:extLst>
+              <a:ext uri="{FF2B5EF4-FFF2-40B4-BE49-F238E27FC236}">
+                <a16:creationId xmlns:a16="http://schemas.microsoft.com/office/drawing/2014/main" id="{B57A2B59-FB5E-C7CA-9B7B-F966E240E0C6}"/>
+              </a:ext>
+            </a:extLst>
+          </p:cNvPr>
           <p:cNvSpPr>
             <a:spLocks noGrp="1"/>
           </p:cNvSpPr>
@@ -15890,26 +16427,26 @@
           <a:lstStyle/>
           <a:p>
             <a:r>
-              <a:rPr lang="en-AU" dirty="0"/>
-              <a:t>What you will learn in this session</a:t>
-            </a:r>
-          </a:p>
-        </p:txBody>
-      </p:sp>
-      <p:sp>
-        <p:nvSpPr>
-          <p:cNvPr id="5" name="Footer Placeholder 4">
-            <a:extLst>
-              <a:ext uri="{FF2B5EF4-FFF2-40B4-BE49-F238E27FC236}">
-                <a16:creationId xmlns:a16="http://schemas.microsoft.com/office/drawing/2014/main" id="{839A4CBB-3097-4233-AC4B-E40743736210}"/>
-              </a:ext>
-            </a:extLst>
-          </p:cNvPr>
-          <p:cNvSpPr>
-            <a:spLocks noGrp="1"/>
-          </p:cNvSpPr>
-          <p:nvPr>
-            <p:ph type="ftr" sz="quarter" idx="12"/>
+              <a:rPr lang="en-US" dirty="0"/>
+              <a:t>Dashboard demo</a:t>
+            </a:r>
+          </a:p>
+        </p:txBody>
+      </p:sp>
+      <p:sp>
+        <p:nvSpPr>
+          <p:cNvPr id="7" name="Text Placeholder 6">
+            <a:extLst>
+              <a:ext uri="{FF2B5EF4-FFF2-40B4-BE49-F238E27FC236}">
+                <a16:creationId xmlns:a16="http://schemas.microsoft.com/office/drawing/2014/main" id="{E190D1DA-69DF-9CCC-77B5-2562D987DB88}"/>
+              </a:ext>
+            </a:extLst>
+          </p:cNvPr>
+          <p:cNvSpPr>
+            <a:spLocks noGrp="1"/>
+          </p:cNvSpPr>
+          <p:nvPr>
+            <p:ph type="body" sz="quarter" idx="10"/>
           </p:nvPr>
         </p:nvSpPr>
         <p:spPr/>
@@ -15918,6 +16455,34 @@
           <a:lstStyle/>
           <a:p>
             <a:r>
+              <a:rPr lang="en-US" dirty="0"/>
+              <a:t>Full dashboard in 20-ish lines of code</a:t>
+            </a:r>
+          </a:p>
+        </p:txBody>
+      </p:sp>
+      <p:sp>
+        <p:nvSpPr>
+          <p:cNvPr id="4" name="Footer Placeholder 3">
+            <a:extLst>
+              <a:ext uri="{FF2B5EF4-FFF2-40B4-BE49-F238E27FC236}">
+                <a16:creationId xmlns:a16="http://schemas.microsoft.com/office/drawing/2014/main" id="{5F4975BB-DEB1-0CD0-A859-E718146F5B74}"/>
+              </a:ext>
+            </a:extLst>
+          </p:cNvPr>
+          <p:cNvSpPr>
+            <a:spLocks noGrp="1"/>
+          </p:cNvSpPr>
+          <p:nvPr>
+            <p:ph type="ftr" sz="quarter" idx="11"/>
+          </p:nvPr>
+        </p:nvSpPr>
+        <p:spPr/>
+        <p:txBody>
+          <a:bodyPr/>
+          <a:lstStyle/>
+          <a:p>
+            <a:r>
               <a:rPr lang="en-AU"/>
               <a:t>Intro to Streamlit</a:t>
             </a:r>
@@ -15927,18 +16492,18 @@
       </p:sp>
       <p:sp>
         <p:nvSpPr>
-          <p:cNvPr id="10" name="Slide Number Placeholder 9">
-            <a:extLst>
-              <a:ext uri="{FF2B5EF4-FFF2-40B4-BE49-F238E27FC236}">
-                <a16:creationId xmlns:a16="http://schemas.microsoft.com/office/drawing/2014/main" id="{E14DA2D9-ABD9-451B-A5BC-C38E555A6AFE}"/>
-              </a:ext>
-            </a:extLst>
-          </p:cNvPr>
-          <p:cNvSpPr>
-            <a:spLocks noGrp="1"/>
-          </p:cNvSpPr>
-          <p:nvPr>
-            <p:ph type="sldNum" sz="quarter" idx="13"/>
+          <p:cNvPr id="5" name="Slide Number Placeholder 4">
+            <a:extLst>
+              <a:ext uri="{FF2B5EF4-FFF2-40B4-BE49-F238E27FC236}">
+                <a16:creationId xmlns:a16="http://schemas.microsoft.com/office/drawing/2014/main" id="{3655B30F-C5F6-4606-F124-735CEC68A89D}"/>
+              </a:ext>
+            </a:extLst>
+          </p:cNvPr>
+          <p:cNvSpPr>
+            <a:spLocks noGrp="1"/>
+          </p:cNvSpPr>
+          <p:nvPr>
+            <p:ph type="sldNum" sz="quarter" idx="12"/>
           </p:nvPr>
         </p:nvSpPr>
         <p:spPr/>
@@ -15958,7 +16523,7 @@
     </p:spTree>
     <p:extLst>
       <p:ext uri="{BB962C8B-B14F-4D97-AF65-F5344CB8AC3E}">
-        <p14:creationId xmlns:p14="http://schemas.microsoft.com/office/powerpoint/2010/main" val="1127843362"/>
+        <p14:creationId xmlns:p14="http://schemas.microsoft.com/office/powerpoint/2010/main" val="180344975"/>
       </p:ext>
     </p:extLst>
   </p:cSld>
@@ -15977,405 +16542,6 @@
       </p:transition>
     </mc:Fallback>
   </mc:AlternateContent>
-  <p:timing>
-    <p:tnLst>
-      <p:par>
-        <p:cTn id="1" dur="indefinite" restart="never" nodeType="tmRoot">
-          <p:childTnLst>
-            <p:seq concurrent="1" nextAc="seek">
-              <p:cTn id="2" dur="indefinite" nodeType="mainSeq">
-                <p:childTnLst>
-                  <p:par>
-                    <p:cTn id="3" fill="hold">
-                      <p:stCondLst>
-                        <p:cond delay="indefinite"/>
-                      </p:stCondLst>
-                      <p:childTnLst>
-                        <p:par>
-                          <p:cTn id="4" fill="hold">
-                            <p:stCondLst>
-                              <p:cond delay="0"/>
-                            </p:stCondLst>
-                            <p:childTnLst>
-                              <p:par>
-                                <p:cTn id="5" presetID="10" presetClass="entr" presetSubtype="0" fill="hold" grpId="0" nodeType="clickEffect">
-                                  <p:stCondLst>
-                                    <p:cond delay="0"/>
-                                  </p:stCondLst>
-                                  <p:childTnLst>
-                                    <p:set>
-                                      <p:cBhvr>
-                                        <p:cTn id="6" dur="1" fill="hold">
-                                          <p:stCondLst>
-                                            <p:cond delay="0"/>
-                                          </p:stCondLst>
-                                        </p:cTn>
-                                        <p:tgtEl>
-                                          <p:spTgt spid="7">
-                                            <p:txEl>
-                                              <p:pRg st="0" end="0"/>
-                                            </p:txEl>
-                                          </p:spTgt>
-                                        </p:tgtEl>
-                                        <p:attrNameLst>
-                                          <p:attrName>style.visibility</p:attrName>
-                                        </p:attrNameLst>
-                                      </p:cBhvr>
-                                      <p:to>
-                                        <p:strVal val="visible"/>
-                                      </p:to>
-                                    </p:set>
-                                    <p:animEffect transition="in" filter="fade">
-                                      <p:cBhvr>
-                                        <p:cTn id="7" dur="500"/>
-                                        <p:tgtEl>
-                                          <p:spTgt spid="7">
-                                            <p:txEl>
-                                              <p:pRg st="0" end="0"/>
-                                            </p:txEl>
-                                          </p:spTgt>
-                                        </p:tgtEl>
-                                      </p:cBhvr>
-                                    </p:animEffect>
-                                  </p:childTnLst>
-                                </p:cTn>
-                              </p:par>
-                            </p:childTnLst>
-                          </p:cTn>
-                        </p:par>
-                      </p:childTnLst>
-                    </p:cTn>
-                  </p:par>
-                  <p:par>
-                    <p:cTn id="8" fill="hold">
-                      <p:stCondLst>
-                        <p:cond delay="indefinite"/>
-                      </p:stCondLst>
-                      <p:childTnLst>
-                        <p:par>
-                          <p:cTn id="9" fill="hold">
-                            <p:stCondLst>
-                              <p:cond delay="0"/>
-                            </p:stCondLst>
-                            <p:childTnLst>
-                              <p:par>
-                                <p:cTn id="10" presetID="10" presetClass="entr" presetSubtype="0" fill="hold" grpId="0" nodeType="clickEffect">
-                                  <p:stCondLst>
-                                    <p:cond delay="0"/>
-                                  </p:stCondLst>
-                                  <p:childTnLst>
-                                    <p:set>
-                                      <p:cBhvr>
-                                        <p:cTn id="11" dur="1" fill="hold">
-                                          <p:stCondLst>
-                                            <p:cond delay="0"/>
-                                          </p:stCondLst>
-                                        </p:cTn>
-                                        <p:tgtEl>
-                                          <p:spTgt spid="7">
-                                            <p:txEl>
-                                              <p:pRg st="1" end="1"/>
-                                            </p:txEl>
-                                          </p:spTgt>
-                                        </p:tgtEl>
-                                        <p:attrNameLst>
-                                          <p:attrName>style.visibility</p:attrName>
-                                        </p:attrNameLst>
-                                      </p:cBhvr>
-                                      <p:to>
-                                        <p:strVal val="visible"/>
-                                      </p:to>
-                                    </p:set>
-                                    <p:animEffect transition="in" filter="fade">
-                                      <p:cBhvr>
-                                        <p:cTn id="12" dur="500"/>
-                                        <p:tgtEl>
-                                          <p:spTgt spid="7">
-                                            <p:txEl>
-                                              <p:pRg st="1" end="1"/>
-                                            </p:txEl>
-                                          </p:spTgt>
-                                        </p:tgtEl>
-                                      </p:cBhvr>
-                                    </p:animEffect>
-                                  </p:childTnLst>
-                                </p:cTn>
-                              </p:par>
-                            </p:childTnLst>
-                          </p:cTn>
-                        </p:par>
-                      </p:childTnLst>
-                    </p:cTn>
-                  </p:par>
-                  <p:par>
-                    <p:cTn id="13" fill="hold">
-                      <p:stCondLst>
-                        <p:cond delay="indefinite"/>
-                      </p:stCondLst>
-                      <p:childTnLst>
-                        <p:par>
-                          <p:cTn id="14" fill="hold">
-                            <p:stCondLst>
-                              <p:cond delay="0"/>
-                            </p:stCondLst>
-                            <p:childTnLst>
-                              <p:par>
-                                <p:cTn id="15" presetID="10" presetClass="entr" presetSubtype="0" fill="hold" grpId="0" nodeType="clickEffect">
-                                  <p:stCondLst>
-                                    <p:cond delay="0"/>
-                                  </p:stCondLst>
-                                  <p:childTnLst>
-                                    <p:set>
-                                      <p:cBhvr>
-                                        <p:cTn id="16" dur="1" fill="hold">
-                                          <p:stCondLst>
-                                            <p:cond delay="0"/>
-                                          </p:stCondLst>
-                                        </p:cTn>
-                                        <p:tgtEl>
-                                          <p:spTgt spid="7">
-                                            <p:txEl>
-                                              <p:pRg st="2" end="2"/>
-                                            </p:txEl>
-                                          </p:spTgt>
-                                        </p:tgtEl>
-                                        <p:attrNameLst>
-                                          <p:attrName>style.visibility</p:attrName>
-                                        </p:attrNameLst>
-                                      </p:cBhvr>
-                                      <p:to>
-                                        <p:strVal val="visible"/>
-                                      </p:to>
-                                    </p:set>
-                                    <p:animEffect transition="in" filter="fade">
-                                      <p:cBhvr>
-                                        <p:cTn id="17" dur="500"/>
-                                        <p:tgtEl>
-                                          <p:spTgt spid="7">
-                                            <p:txEl>
-                                              <p:pRg st="2" end="2"/>
-                                            </p:txEl>
-                                          </p:spTgt>
-                                        </p:tgtEl>
-                                      </p:cBhvr>
-                                    </p:animEffect>
-                                  </p:childTnLst>
-                                </p:cTn>
-                              </p:par>
-                            </p:childTnLst>
-                          </p:cTn>
-                        </p:par>
-                      </p:childTnLst>
-                    </p:cTn>
-                  </p:par>
-                  <p:par>
-                    <p:cTn id="18" fill="hold">
-                      <p:stCondLst>
-                        <p:cond delay="indefinite"/>
-                      </p:stCondLst>
-                      <p:childTnLst>
-                        <p:par>
-                          <p:cTn id="19" fill="hold">
-                            <p:stCondLst>
-                              <p:cond delay="0"/>
-                            </p:stCondLst>
-                            <p:childTnLst>
-                              <p:par>
-                                <p:cTn id="20" presetID="10" presetClass="entr" presetSubtype="0" fill="hold" grpId="0" nodeType="clickEffect">
-                                  <p:stCondLst>
-                                    <p:cond delay="0"/>
-                                  </p:stCondLst>
-                                  <p:childTnLst>
-                                    <p:set>
-                                      <p:cBhvr>
-                                        <p:cTn id="21" dur="1" fill="hold">
-                                          <p:stCondLst>
-                                            <p:cond delay="0"/>
-                                          </p:stCondLst>
-                                        </p:cTn>
-                                        <p:tgtEl>
-                                          <p:spTgt spid="7">
-                                            <p:txEl>
-                                              <p:pRg st="3" end="3"/>
-                                            </p:txEl>
-                                          </p:spTgt>
-                                        </p:tgtEl>
-                                        <p:attrNameLst>
-                                          <p:attrName>style.visibility</p:attrName>
-                                        </p:attrNameLst>
-                                      </p:cBhvr>
-                                      <p:to>
-                                        <p:strVal val="visible"/>
-                                      </p:to>
-                                    </p:set>
-                                    <p:animEffect transition="in" filter="fade">
-                                      <p:cBhvr>
-                                        <p:cTn id="22" dur="500"/>
-                                        <p:tgtEl>
-                                          <p:spTgt spid="7">
-                                            <p:txEl>
-                                              <p:pRg st="3" end="3"/>
-                                            </p:txEl>
-                                          </p:spTgt>
-                                        </p:tgtEl>
-                                      </p:cBhvr>
-                                    </p:animEffect>
-                                  </p:childTnLst>
-                                </p:cTn>
-                              </p:par>
-                            </p:childTnLst>
-                          </p:cTn>
-                        </p:par>
-                      </p:childTnLst>
-                    </p:cTn>
-                  </p:par>
-                  <p:par>
-                    <p:cTn id="23" fill="hold">
-                      <p:stCondLst>
-                        <p:cond delay="indefinite"/>
-                      </p:stCondLst>
-                      <p:childTnLst>
-                        <p:par>
-                          <p:cTn id="24" fill="hold">
-                            <p:stCondLst>
-                              <p:cond delay="0"/>
-                            </p:stCondLst>
-                            <p:childTnLst>
-                              <p:par>
-                                <p:cTn id="25" presetID="10" presetClass="entr" presetSubtype="0" fill="hold" grpId="0" nodeType="clickEffect">
-                                  <p:stCondLst>
-                                    <p:cond delay="0"/>
-                                  </p:stCondLst>
-                                  <p:childTnLst>
-                                    <p:set>
-                                      <p:cBhvr>
-                                        <p:cTn id="26" dur="1" fill="hold">
-                                          <p:stCondLst>
-                                            <p:cond delay="0"/>
-                                          </p:stCondLst>
-                                        </p:cTn>
-                                        <p:tgtEl>
-                                          <p:spTgt spid="7">
-                                            <p:txEl>
-                                              <p:pRg st="4" end="4"/>
-                                            </p:txEl>
-                                          </p:spTgt>
-                                        </p:tgtEl>
-                                        <p:attrNameLst>
-                                          <p:attrName>style.visibility</p:attrName>
-                                        </p:attrNameLst>
-                                      </p:cBhvr>
-                                      <p:to>
-                                        <p:strVal val="visible"/>
-                                      </p:to>
-                                    </p:set>
-                                    <p:animEffect transition="in" filter="fade">
-                                      <p:cBhvr>
-                                        <p:cTn id="27" dur="500"/>
-                                        <p:tgtEl>
-                                          <p:spTgt spid="7">
-                                            <p:txEl>
-                                              <p:pRg st="4" end="4"/>
-                                            </p:txEl>
-                                          </p:spTgt>
-                                        </p:tgtEl>
-                                      </p:cBhvr>
-                                    </p:animEffect>
-                                  </p:childTnLst>
-                                </p:cTn>
-                              </p:par>
-                            </p:childTnLst>
-                          </p:cTn>
-                        </p:par>
-                      </p:childTnLst>
-                    </p:cTn>
-                  </p:par>
-                  <p:par>
-                    <p:cTn id="28" fill="hold">
-                      <p:stCondLst>
-                        <p:cond delay="indefinite"/>
-                      </p:stCondLst>
-                      <p:childTnLst>
-                        <p:par>
-                          <p:cTn id="29" fill="hold">
-                            <p:stCondLst>
-                              <p:cond delay="0"/>
-                            </p:stCondLst>
-                            <p:childTnLst>
-                              <p:par>
-                                <p:cTn id="30" presetID="10" presetClass="entr" presetSubtype="0" fill="hold" grpId="0" nodeType="clickEffect">
-                                  <p:stCondLst>
-                                    <p:cond delay="0"/>
-                                  </p:stCondLst>
-                                  <p:childTnLst>
-                                    <p:set>
-                                      <p:cBhvr>
-                                        <p:cTn id="31" dur="1" fill="hold">
-                                          <p:stCondLst>
-                                            <p:cond delay="0"/>
-                                          </p:stCondLst>
-                                        </p:cTn>
-                                        <p:tgtEl>
-                                          <p:spTgt spid="7">
-                                            <p:txEl>
-                                              <p:pRg st="5" end="5"/>
-                                            </p:txEl>
-                                          </p:spTgt>
-                                        </p:tgtEl>
-                                        <p:attrNameLst>
-                                          <p:attrName>style.visibility</p:attrName>
-                                        </p:attrNameLst>
-                                      </p:cBhvr>
-                                      <p:to>
-                                        <p:strVal val="visible"/>
-                                      </p:to>
-                                    </p:set>
-                                    <p:animEffect transition="in" filter="fade">
-                                      <p:cBhvr>
-                                        <p:cTn id="32" dur="500"/>
-                                        <p:tgtEl>
-                                          <p:spTgt spid="7">
-                                            <p:txEl>
-                                              <p:pRg st="5" end="5"/>
-                                            </p:txEl>
-                                          </p:spTgt>
-                                        </p:tgtEl>
-                                      </p:cBhvr>
-                                    </p:animEffect>
-                                  </p:childTnLst>
-                                </p:cTn>
-                              </p:par>
-                            </p:childTnLst>
-                          </p:cTn>
-                        </p:par>
-                      </p:childTnLst>
-                    </p:cTn>
-                  </p:par>
-                </p:childTnLst>
-              </p:cTn>
-              <p:prevCondLst>
-                <p:cond evt="onPrev" delay="0">
-                  <p:tgtEl>
-                    <p:sldTgt/>
-                  </p:tgtEl>
-                </p:cond>
-              </p:prevCondLst>
-              <p:nextCondLst>
-                <p:cond evt="onNext" delay="0">
-                  <p:tgtEl>
-                    <p:sldTgt/>
-                  </p:tgtEl>
-                </p:cond>
-              </p:nextCondLst>
-            </p:seq>
-          </p:childTnLst>
-        </p:cTn>
-      </p:par>
-    </p:tnLst>
-    <p:bldLst>
-      <p:bldP spid="7" grpId="0" build="p"/>
-    </p:bldLst>
-  </p:timing>
 </p:sld>
 </file>
 

</xml_diff>